<commit_message>
updating still need to do 2 more sections
</commit_message>
<xml_diff>
--- a/CLR_via_CSharp/Chapter8/Methods.pptx
+++ b/CLR_via_CSharp/Chapter8/Methods.pptx
@@ -12,6 +12,7 @@
     <p:sldId id="260" r:id="rId6"/>
     <p:sldId id="261" r:id="rId7"/>
     <p:sldId id="262" r:id="rId8"/>
+    <p:sldId id="263" r:id="rId9"/>
   </p:sldIdLst>
   <p:sldSz cx="12192000" cy="6858000"/>
   <p:notesSz cx="6858000" cy="9144000"/>
@@ -110,6 +111,11 @@
       </a:defRPr>
     </a:lvl9pPr>
   </p:defaultTextStyle>
+  <p:extLst>
+    <p:ext uri="{EFAFB233-063F-42B5-8137-9DF3F51BA10A}">
+      <p15:sldGuideLst xmlns:p15="http://schemas.microsoft.com/office/powerpoint/2012/main"/>
+    </p:ext>
+  </p:extLst>
 </p:presentation>
 </file>
 
@@ -3023,7 +3029,10 @@
           <a:bodyPr/>
           <a:lstStyle/>
           <a:p>
-            <a:endParaRPr lang="en-US"/>
+            <a:r>
+              <a:rPr lang="en-US" dirty="0"/>
+              <a:t>Srikar Mylavarapu</a:t>
+            </a:r>
           </a:p>
         </p:txBody>
       </p:sp>
@@ -3494,7 +3503,15 @@
           <a:p>
             <a:r>
               <a:rPr lang="en-US" dirty="0"/>
-              <a:t>Some Deserialization thing that looks like trivia</a:t>
+              <a:t>Some Deserialization thing that looks like trivia (or to be talked about at </a:t>
+            </a:r>
+            <a:r>
+              <a:rPr lang="en-US" dirty="0" err="1"/>
+              <a:t>ch</a:t>
+            </a:r>
+            <a:r>
+              <a:rPr lang="en-US" dirty="0"/>
+              <a:t> 24)</a:t>
             </a:r>
           </a:p>
           <a:p>
@@ -4135,7 +4152,10 @@
             <a:pPr marL="0" indent="0">
               <a:buNone/>
             </a:pPr>
-            <a:endParaRPr lang="en-US" dirty="0"/>
+            <a:r>
+              <a:rPr lang="en-US" dirty="0"/>
+              <a:t>List rules here</a:t>
+            </a:r>
           </a:p>
         </p:txBody>
       </p:sp>
@@ -4143,6 +4163,168 @@
     <p:extLst>
       <p:ext uri="{BB962C8B-B14F-4D97-AF65-F5344CB8AC3E}">
         <p14:creationId xmlns:p14="http://schemas.microsoft.com/office/powerpoint/2010/main" val="490701922"/>
+      </p:ext>
+    </p:extLst>
+  </p:cSld>
+  <p:clrMapOvr>
+    <a:masterClrMapping/>
+  </p:clrMapOvr>
+</p:sld>
+</file>
+
+<file path=ppt/slides/slide8.xml><?xml version="1.0" encoding="utf-8"?>
+<p:sld xmlns:a="http://schemas.openxmlformats.org/drawingml/2006/main" xmlns:r="http://schemas.openxmlformats.org/officeDocument/2006/relationships" xmlns:p="http://schemas.openxmlformats.org/presentationml/2006/main">
+  <p:cSld>
+    <p:spTree>
+      <p:nvGrpSpPr>
+        <p:cNvPr id="1" name=""/>
+        <p:cNvGrpSpPr/>
+        <p:nvPr/>
+      </p:nvGrpSpPr>
+      <p:grpSpPr>
+        <a:xfrm>
+          <a:off x="0" y="0"/>
+          <a:ext cx="0" cy="0"/>
+          <a:chOff x="0" y="0"/>
+          <a:chExt cx="0" cy="0"/>
+        </a:xfrm>
+      </p:grpSpPr>
+      <p:sp>
+        <p:nvSpPr>
+          <p:cNvPr id="2" name="Title 1">
+            <a:extLst>
+              <a:ext uri="{FF2B5EF4-FFF2-40B4-BE49-F238E27FC236}">
+                <a16:creationId xmlns:a16="http://schemas.microsoft.com/office/drawing/2014/main" id="{5396D172-8E34-520C-11EF-82378A312CF8}"/>
+              </a:ext>
+            </a:extLst>
+          </p:cNvPr>
+          <p:cNvSpPr>
+            <a:spLocks noGrp="1"/>
+          </p:cNvSpPr>
+          <p:nvPr>
+            <p:ph type="title"/>
+          </p:nvPr>
+        </p:nvSpPr>
+        <p:spPr/>
+        <p:txBody>
+          <a:bodyPr/>
+          <a:lstStyle/>
+          <a:p>
+            <a:r>
+              <a:rPr lang="en-US" dirty="0"/>
+              <a:t>Type constructors</a:t>
+            </a:r>
+          </a:p>
+        </p:txBody>
+      </p:sp>
+      <p:sp>
+        <p:nvSpPr>
+          <p:cNvPr id="3" name="Content Placeholder 2">
+            <a:extLst>
+              <a:ext uri="{FF2B5EF4-FFF2-40B4-BE49-F238E27FC236}">
+                <a16:creationId xmlns:a16="http://schemas.microsoft.com/office/drawing/2014/main" id="{8CEC85C3-F24F-299C-23C2-356EA4499CA3}"/>
+              </a:ext>
+            </a:extLst>
+          </p:cNvPr>
+          <p:cNvSpPr>
+            <a:spLocks noGrp="1"/>
+          </p:cNvSpPr>
+          <p:nvPr>
+            <p:ph idx="1"/>
+          </p:nvPr>
+        </p:nvSpPr>
+        <p:spPr/>
+        <p:txBody>
+          <a:bodyPr/>
+          <a:lstStyle/>
+          <a:p>
+            <a:r>
+              <a:rPr lang="en-US" dirty="0"/>
+              <a:t>AKA static constructors, class constructors, and type initializers</a:t>
+            </a:r>
+          </a:p>
+          <a:p>
+            <a:r>
+              <a:rPr lang="en-US" dirty="0"/>
+              <a:t>Applied to interfaces (not via </a:t>
+            </a:r>
+            <a:r>
+              <a:rPr lang="en-US" dirty="0" err="1"/>
+              <a:t>c#</a:t>
+            </a:r>
+            <a:r>
+              <a:rPr lang="en-US" dirty="0"/>
+              <a:t>), ref and value types</a:t>
+            </a:r>
+          </a:p>
+          <a:p>
+            <a:r>
+              <a:rPr lang="en-US" dirty="0"/>
+              <a:t>Never have parameters</a:t>
+            </a:r>
+          </a:p>
+          <a:p>
+            <a:r>
+              <a:rPr lang="en-US" dirty="0"/>
+              <a:t>Set the initial state of a type </a:t>
+            </a:r>
+            <a:r>
+              <a:rPr lang="en-US" dirty="0">
+                <a:sym typeface="Wingdings" panose="05000000000000000000" pitchFamily="2" charset="2"/>
+              </a:rPr>
+              <a:t> </a:t>
+            </a:r>
+            <a:r>
+              <a:rPr lang="en-US" dirty="0" err="1">
+                <a:sym typeface="Wingdings" panose="05000000000000000000" pitchFamily="2" charset="2"/>
+              </a:rPr>
+              <a:t>ctors</a:t>
+            </a:r>
+            <a:r>
+              <a:rPr lang="en-US" dirty="0">
+                <a:sym typeface="Wingdings" panose="05000000000000000000" pitchFamily="2" charset="2"/>
+              </a:rPr>
+              <a:t> run first time type is accessed</a:t>
+            </a:r>
+          </a:p>
+          <a:p>
+            <a:r>
+              <a:rPr lang="en-US" dirty="0">
+                <a:sym typeface="Wingdings" panose="05000000000000000000" pitchFamily="2" charset="2"/>
+              </a:rPr>
+              <a:t>Must be marked static</a:t>
+            </a:r>
+          </a:p>
+          <a:p>
+            <a:pPr lvl="1"/>
+            <a:r>
+              <a:rPr lang="en-US" dirty="0">
+                <a:sym typeface="Wingdings" panose="05000000000000000000" pitchFamily="2" charset="2"/>
+              </a:rPr>
+              <a:t>In generalization  I view these as “instantiating the type” in </a:t>
+            </a:r>
+            <a:r>
+              <a:rPr lang="en-US">
+                <a:sym typeface="Wingdings" panose="05000000000000000000" pitchFamily="2" charset="2"/>
+              </a:rPr>
+              <a:t>the CLR</a:t>
+            </a:r>
+            <a:endParaRPr lang="en-US" dirty="0">
+              <a:sym typeface="Wingdings" panose="05000000000000000000" pitchFamily="2" charset="2"/>
+            </a:endParaRPr>
+          </a:p>
+          <a:p>
+            <a:pPr marL="0" indent="0">
+              <a:buNone/>
+            </a:pPr>
+            <a:endParaRPr lang="en-US" dirty="0"/>
+          </a:p>
+        </p:txBody>
+      </p:sp>
+    </p:spTree>
+    <p:extLst>
+      <p:ext uri="{BB962C8B-B14F-4D97-AF65-F5344CB8AC3E}">
+        <p14:creationId xmlns:p14="http://schemas.microsoft.com/office/powerpoint/2010/main" val="591969481"/>
       </p:ext>
     </p:extLst>
   </p:cSld>

</xml_diff>

<commit_message>
adding basics for extension method
</commit_message>
<xml_diff>
--- a/CLR_via_CSharp/Chapter8/Methods.pptx
+++ b/CLR_via_CSharp/Chapter8/Methods.pptx
@@ -13,6 +13,10 @@
     <p:sldId id="261" r:id="rId7"/>
     <p:sldId id="262" r:id="rId8"/>
     <p:sldId id="263" r:id="rId9"/>
+    <p:sldId id="264" r:id="rId10"/>
+    <p:sldId id="265" r:id="rId11"/>
+    <p:sldId id="266" r:id="rId12"/>
+    <p:sldId id="267" r:id="rId13"/>
   </p:sldIdLst>
   <p:sldSz cx="12192000" cy="6858000"/>
   <p:notesSz cx="6858000" cy="9144000"/>
@@ -250,7 +254,7 @@
           <a:p>
             <a:fld id="{98DD24A6-AA06-417A-A133-0B2797F53703}" type="datetimeFigureOut">
               <a:rPr lang="en-US" smtClean="0"/>
-              <a:t>8/24/2022</a:t>
+              <a:t>8/25/2022</a:t>
             </a:fld>
             <a:endParaRPr lang="en-US"/>
           </a:p>
@@ -420,7 +424,7 @@
           <a:p>
             <a:fld id="{98DD24A6-AA06-417A-A133-0B2797F53703}" type="datetimeFigureOut">
               <a:rPr lang="en-US" smtClean="0"/>
-              <a:t>8/24/2022</a:t>
+              <a:t>8/25/2022</a:t>
             </a:fld>
             <a:endParaRPr lang="en-US"/>
           </a:p>
@@ -600,7 +604,7 @@
           <a:p>
             <a:fld id="{98DD24A6-AA06-417A-A133-0B2797F53703}" type="datetimeFigureOut">
               <a:rPr lang="en-US" smtClean="0"/>
-              <a:t>8/24/2022</a:t>
+              <a:t>8/25/2022</a:t>
             </a:fld>
             <a:endParaRPr lang="en-US"/>
           </a:p>
@@ -770,7 +774,7 @@
           <a:p>
             <a:fld id="{98DD24A6-AA06-417A-A133-0B2797F53703}" type="datetimeFigureOut">
               <a:rPr lang="en-US" smtClean="0"/>
-              <a:t>8/24/2022</a:t>
+              <a:t>8/25/2022</a:t>
             </a:fld>
             <a:endParaRPr lang="en-US"/>
           </a:p>
@@ -1016,7 +1020,7 @@
           <a:p>
             <a:fld id="{98DD24A6-AA06-417A-A133-0B2797F53703}" type="datetimeFigureOut">
               <a:rPr lang="en-US" smtClean="0"/>
-              <a:t>8/24/2022</a:t>
+              <a:t>8/25/2022</a:t>
             </a:fld>
             <a:endParaRPr lang="en-US"/>
           </a:p>
@@ -1248,7 +1252,7 @@
           <a:p>
             <a:fld id="{98DD24A6-AA06-417A-A133-0B2797F53703}" type="datetimeFigureOut">
               <a:rPr lang="en-US" smtClean="0"/>
-              <a:t>8/24/2022</a:t>
+              <a:t>8/25/2022</a:t>
             </a:fld>
             <a:endParaRPr lang="en-US"/>
           </a:p>
@@ -1615,7 +1619,7 @@
           <a:p>
             <a:fld id="{98DD24A6-AA06-417A-A133-0B2797F53703}" type="datetimeFigureOut">
               <a:rPr lang="en-US" smtClean="0"/>
-              <a:t>8/24/2022</a:t>
+              <a:t>8/25/2022</a:t>
             </a:fld>
             <a:endParaRPr lang="en-US"/>
           </a:p>
@@ -1733,7 +1737,7 @@
           <a:p>
             <a:fld id="{98DD24A6-AA06-417A-A133-0B2797F53703}" type="datetimeFigureOut">
               <a:rPr lang="en-US" smtClean="0"/>
-              <a:t>8/24/2022</a:t>
+              <a:t>8/25/2022</a:t>
             </a:fld>
             <a:endParaRPr lang="en-US"/>
           </a:p>
@@ -1828,7 +1832,7 @@
           <a:p>
             <a:fld id="{98DD24A6-AA06-417A-A133-0B2797F53703}" type="datetimeFigureOut">
               <a:rPr lang="en-US" smtClean="0"/>
-              <a:t>8/24/2022</a:t>
+              <a:t>8/25/2022</a:t>
             </a:fld>
             <a:endParaRPr lang="en-US"/>
           </a:p>
@@ -2105,7 +2109,7 @@
           <a:p>
             <a:fld id="{98DD24A6-AA06-417A-A133-0B2797F53703}" type="datetimeFigureOut">
               <a:rPr lang="en-US" smtClean="0"/>
-              <a:t>8/24/2022</a:t>
+              <a:t>8/25/2022</a:t>
             </a:fld>
             <a:endParaRPr lang="en-US"/>
           </a:p>
@@ -2362,7 +2366,7 @@
           <a:p>
             <a:fld id="{98DD24A6-AA06-417A-A133-0B2797F53703}" type="datetimeFigureOut">
               <a:rPr lang="en-US" smtClean="0"/>
-              <a:t>8/24/2022</a:t>
+              <a:t>8/25/2022</a:t>
             </a:fld>
             <a:endParaRPr lang="en-US"/>
           </a:p>
@@ -2575,7 +2579,7 @@
           <a:p>
             <a:fld id="{98DD24A6-AA06-417A-A133-0B2797F53703}" type="datetimeFigureOut">
               <a:rPr lang="en-US" smtClean="0"/>
-              <a:t>8/24/2022</a:t>
+              <a:t>8/25/2022</a:t>
             </a:fld>
             <a:endParaRPr lang="en-US"/>
           </a:p>
@@ -3049,6 +3053,361 @@
 </p:sld>
 </file>
 
+<file path=ppt/slides/slide10.xml><?xml version="1.0" encoding="utf-8"?>
+<p:sld xmlns:a="http://schemas.openxmlformats.org/drawingml/2006/main" xmlns:r="http://schemas.openxmlformats.org/officeDocument/2006/relationships" xmlns:p="http://schemas.openxmlformats.org/presentationml/2006/main">
+  <p:cSld>
+    <p:spTree>
+      <p:nvGrpSpPr>
+        <p:cNvPr id="1" name=""/>
+        <p:cNvGrpSpPr/>
+        <p:nvPr/>
+      </p:nvGrpSpPr>
+      <p:grpSpPr>
+        <a:xfrm>
+          <a:off x="0" y="0"/>
+          <a:ext cx="0" cy="0"/>
+          <a:chOff x="0" y="0"/>
+          <a:chExt cx="0" cy="0"/>
+        </a:xfrm>
+      </p:grpSpPr>
+      <p:sp>
+        <p:nvSpPr>
+          <p:cNvPr id="2" name="Title 1">
+            <a:extLst>
+              <a:ext uri="{FF2B5EF4-FFF2-40B4-BE49-F238E27FC236}">
+                <a16:creationId xmlns:a16="http://schemas.microsoft.com/office/drawing/2014/main" id="{42126C2B-4DB1-B7CC-A7C9-E80DD6FFDA16}"/>
+              </a:ext>
+            </a:extLst>
+          </p:cNvPr>
+          <p:cNvSpPr>
+            <a:spLocks noGrp="1"/>
+          </p:cNvSpPr>
+          <p:nvPr>
+            <p:ph type="title"/>
+          </p:nvPr>
+        </p:nvSpPr>
+        <p:spPr/>
+        <p:txBody>
+          <a:bodyPr/>
+          <a:lstStyle/>
+          <a:p>
+            <a:r>
+              <a:rPr lang="en-US" dirty="0"/>
+              <a:t>Oh Jeff</a:t>
+            </a:r>
+          </a:p>
+        </p:txBody>
+      </p:sp>
+      <p:sp>
+        <p:nvSpPr>
+          <p:cNvPr id="3" name="Content Placeholder 2">
+            <a:extLst>
+              <a:ext uri="{FF2B5EF4-FFF2-40B4-BE49-F238E27FC236}">
+                <a16:creationId xmlns:a16="http://schemas.microsoft.com/office/drawing/2014/main" id="{1945C8B8-6B3C-BA82-C4B1-81A747F49427}"/>
+              </a:ext>
+            </a:extLst>
+          </p:cNvPr>
+          <p:cNvSpPr>
+            <a:spLocks noGrp="1"/>
+          </p:cNvSpPr>
+          <p:nvPr>
+            <p:ph idx="1"/>
+          </p:nvPr>
+        </p:nvSpPr>
+        <p:spPr/>
+        <p:txBody>
+          <a:bodyPr/>
+          <a:lstStyle/>
+          <a:p>
+            <a:r>
+              <a:rPr lang="en-US" dirty="0"/>
+              <a:t>Rules for operator overloading are complicated</a:t>
+            </a:r>
+          </a:p>
+          <a:p>
+            <a:pPr lvl="1"/>
+            <a:r>
+              <a:rPr lang="en-US" dirty="0"/>
+              <a:t>Honestly not worth delving into here</a:t>
+            </a:r>
+          </a:p>
+          <a:p>
+            <a:r>
+              <a:rPr lang="en-US" dirty="0"/>
+              <a:t>Jeff wishes that there were friendlier special names for the </a:t>
+            </a:r>
+          </a:p>
+          <a:p>
+            <a:pPr marL="0" indent="0">
+              <a:buNone/>
+            </a:pPr>
+            <a:r>
+              <a:rPr lang="en-US" dirty="0" err="1"/>
+              <a:t>op_special</a:t>
+            </a:r>
+            <a:r>
+              <a:rPr lang="en-US" dirty="0"/>
+              <a:t> method names. Wishes we could overload them easier. Some people want climate change to be solved, jeff just wants Microsoft to make it easier to overload things.</a:t>
+            </a:r>
+          </a:p>
+        </p:txBody>
+      </p:sp>
+    </p:spTree>
+    <p:extLst>
+      <p:ext uri="{BB962C8B-B14F-4D97-AF65-F5344CB8AC3E}">
+        <p14:creationId xmlns:p14="http://schemas.microsoft.com/office/powerpoint/2010/main" val="109047769"/>
+      </p:ext>
+    </p:extLst>
+  </p:cSld>
+  <p:clrMapOvr>
+    <a:masterClrMapping/>
+  </p:clrMapOvr>
+</p:sld>
+</file>
+
+<file path=ppt/slides/slide11.xml><?xml version="1.0" encoding="utf-8"?>
+<p:sld xmlns:a="http://schemas.openxmlformats.org/drawingml/2006/main" xmlns:r="http://schemas.openxmlformats.org/officeDocument/2006/relationships" xmlns:p="http://schemas.openxmlformats.org/presentationml/2006/main">
+  <p:cSld>
+    <p:spTree>
+      <p:nvGrpSpPr>
+        <p:cNvPr id="1" name=""/>
+        <p:cNvGrpSpPr/>
+        <p:nvPr/>
+      </p:nvGrpSpPr>
+      <p:grpSpPr>
+        <a:xfrm>
+          <a:off x="0" y="0"/>
+          <a:ext cx="0" cy="0"/>
+          <a:chOff x="0" y="0"/>
+          <a:chExt cx="0" cy="0"/>
+        </a:xfrm>
+      </p:grpSpPr>
+      <p:sp>
+        <p:nvSpPr>
+          <p:cNvPr id="2" name="Title 1">
+            <a:extLst>
+              <a:ext uri="{FF2B5EF4-FFF2-40B4-BE49-F238E27FC236}">
+                <a16:creationId xmlns:a16="http://schemas.microsoft.com/office/drawing/2014/main" id="{CFF46BC8-0F66-746A-3290-7A3BBF7FB4A9}"/>
+              </a:ext>
+            </a:extLst>
+          </p:cNvPr>
+          <p:cNvSpPr>
+            <a:spLocks noGrp="1"/>
+          </p:cNvSpPr>
+          <p:nvPr>
+            <p:ph type="title"/>
+          </p:nvPr>
+        </p:nvSpPr>
+        <p:spPr/>
+        <p:txBody>
+          <a:bodyPr/>
+          <a:lstStyle/>
+          <a:p>
+            <a:r>
+              <a:rPr lang="en-US" dirty="0"/>
+              <a:t>Conversion Operator methods</a:t>
+            </a:r>
+          </a:p>
+        </p:txBody>
+      </p:sp>
+      <p:sp>
+        <p:nvSpPr>
+          <p:cNvPr id="3" name="Content Placeholder 2">
+            <a:extLst>
+              <a:ext uri="{FF2B5EF4-FFF2-40B4-BE49-F238E27FC236}">
+                <a16:creationId xmlns:a16="http://schemas.microsoft.com/office/drawing/2014/main" id="{E7081219-EA54-E2A3-59CB-105955BBD4F9}"/>
+              </a:ext>
+            </a:extLst>
+          </p:cNvPr>
+          <p:cNvSpPr>
+            <a:spLocks noGrp="1"/>
+          </p:cNvSpPr>
+          <p:nvPr>
+            <p:ph idx="1"/>
+          </p:nvPr>
+        </p:nvSpPr>
+        <p:spPr/>
+        <p:txBody>
+          <a:bodyPr/>
+          <a:lstStyle/>
+          <a:p>
+            <a:r>
+              <a:rPr lang="en-US" dirty="0"/>
+              <a:t>Primitive types take care of this automatically</a:t>
+            </a:r>
+          </a:p>
+          <a:p>
+            <a:pPr lvl="1"/>
+            <a:r>
+              <a:rPr lang="en-US" dirty="0"/>
+              <a:t>See the Byte to Int</a:t>
+            </a:r>
+          </a:p>
+          <a:p>
+            <a:r>
+              <a:rPr lang="en-US" dirty="0"/>
+              <a:t>What if it’s not a primitive type</a:t>
+            </a:r>
+          </a:p>
+          <a:p>
+            <a:pPr lvl="1"/>
+            <a:r>
+              <a:rPr lang="en-US" dirty="0"/>
+              <a:t>At some level, all of this has to be defined.</a:t>
+            </a:r>
+          </a:p>
+          <a:p>
+            <a:r>
+              <a:rPr lang="en-US" dirty="0"/>
+              <a:t>Trying something new</a:t>
+            </a:r>
+          </a:p>
+          <a:p>
+            <a:pPr lvl="1"/>
+            <a:r>
+              <a:rPr lang="en-US" dirty="0"/>
+              <a:t>Look at Microsoft docs example byte </a:t>
+            </a:r>
+            <a:r>
+              <a:rPr lang="en-US" dirty="0">
+                <a:sym typeface="Wingdings" panose="05000000000000000000" pitchFamily="2" charset="2"/>
+              </a:rPr>
+              <a:t> digit</a:t>
+            </a:r>
+          </a:p>
+          <a:p>
+            <a:pPr lvl="1"/>
+            <a:r>
+              <a:rPr lang="en-US" dirty="0" err="1">
+                <a:sym typeface="Wingdings" panose="05000000000000000000" pitchFamily="2" charset="2"/>
+              </a:rPr>
+              <a:t>System.Decimal</a:t>
+            </a:r>
+            <a:endParaRPr lang="en-US" dirty="0">
+              <a:sym typeface="Wingdings" panose="05000000000000000000" pitchFamily="2" charset="2"/>
+            </a:endParaRPr>
+          </a:p>
+          <a:p>
+            <a:pPr lvl="2"/>
+            <a:r>
+              <a:rPr lang="en-US" dirty="0">
+                <a:sym typeface="Wingdings" panose="05000000000000000000" pitchFamily="2" charset="2"/>
+              </a:rPr>
+              <a:t>Explicit vs implicit</a:t>
+            </a:r>
+          </a:p>
+        </p:txBody>
+      </p:sp>
+    </p:spTree>
+    <p:extLst>
+      <p:ext uri="{BB962C8B-B14F-4D97-AF65-F5344CB8AC3E}">
+        <p14:creationId xmlns:p14="http://schemas.microsoft.com/office/powerpoint/2010/main" val="3376344836"/>
+      </p:ext>
+    </p:extLst>
+  </p:cSld>
+  <p:clrMapOvr>
+    <a:masterClrMapping/>
+  </p:clrMapOvr>
+</p:sld>
+</file>
+
+<file path=ppt/slides/slide12.xml><?xml version="1.0" encoding="utf-8"?>
+<p:sld xmlns:a="http://schemas.openxmlformats.org/drawingml/2006/main" xmlns:r="http://schemas.openxmlformats.org/officeDocument/2006/relationships" xmlns:p="http://schemas.openxmlformats.org/presentationml/2006/main">
+  <p:cSld>
+    <p:spTree>
+      <p:nvGrpSpPr>
+        <p:cNvPr id="1" name=""/>
+        <p:cNvGrpSpPr/>
+        <p:nvPr/>
+      </p:nvGrpSpPr>
+      <p:grpSpPr>
+        <a:xfrm>
+          <a:off x="0" y="0"/>
+          <a:ext cx="0" cy="0"/>
+          <a:chOff x="0" y="0"/>
+          <a:chExt cx="0" cy="0"/>
+        </a:xfrm>
+      </p:grpSpPr>
+      <p:sp>
+        <p:nvSpPr>
+          <p:cNvPr id="2" name="Title 1">
+            <a:extLst>
+              <a:ext uri="{FF2B5EF4-FFF2-40B4-BE49-F238E27FC236}">
+                <a16:creationId xmlns:a16="http://schemas.microsoft.com/office/drawing/2014/main" id="{141E4AE1-D81E-0B19-923C-7D4D7BAB89F9}"/>
+              </a:ext>
+            </a:extLst>
+          </p:cNvPr>
+          <p:cNvSpPr>
+            <a:spLocks noGrp="1"/>
+          </p:cNvSpPr>
+          <p:nvPr>
+            <p:ph type="title"/>
+          </p:nvPr>
+        </p:nvSpPr>
+        <p:spPr/>
+        <p:txBody>
+          <a:bodyPr/>
+          <a:lstStyle/>
+          <a:p>
+            <a:r>
+              <a:rPr lang="en-US" dirty="0"/>
+              <a:t>Extension Methods</a:t>
+            </a:r>
+          </a:p>
+        </p:txBody>
+      </p:sp>
+      <p:sp>
+        <p:nvSpPr>
+          <p:cNvPr id="3" name="Content Placeholder 2">
+            <a:extLst>
+              <a:ext uri="{FF2B5EF4-FFF2-40B4-BE49-F238E27FC236}">
+                <a16:creationId xmlns:a16="http://schemas.microsoft.com/office/drawing/2014/main" id="{314EE536-5DA8-7179-0BE3-3C4404133CB6}"/>
+              </a:ext>
+            </a:extLst>
+          </p:cNvPr>
+          <p:cNvSpPr>
+            <a:spLocks noGrp="1"/>
+          </p:cNvSpPr>
+          <p:nvPr>
+            <p:ph idx="1"/>
+          </p:nvPr>
+        </p:nvSpPr>
+        <p:spPr/>
+        <p:txBody>
+          <a:bodyPr/>
+          <a:lstStyle/>
+          <a:p>
+            <a:r>
+              <a:rPr lang="en-US" dirty="0"/>
+              <a:t>Lets you “extend” methods or add methods to an existing type</a:t>
+            </a:r>
+          </a:p>
+          <a:p>
+            <a:r>
+              <a:rPr lang="en-US" dirty="0"/>
+              <a:t>Jeff says the best way to understanding it is via string builder, so lets see if I can get that written up before </a:t>
+            </a:r>
+            <a:r>
+              <a:rPr lang="en-US"/>
+              <a:t>our session.</a:t>
+            </a:r>
+            <a:endParaRPr lang="en-US" dirty="0"/>
+          </a:p>
+        </p:txBody>
+      </p:sp>
+    </p:spTree>
+    <p:extLst>
+      <p:ext uri="{BB962C8B-B14F-4D97-AF65-F5344CB8AC3E}">
+        <p14:creationId xmlns:p14="http://schemas.microsoft.com/office/powerpoint/2010/main" val="824825819"/>
+      </p:ext>
+    </p:extLst>
+  </p:cSld>
+  <p:clrMapOvr>
+    <a:masterClrMapping/>
+  </p:clrMapOvr>
+</p:sld>
+</file>
+
 <file path=ppt/slides/slide2.xml><?xml version="1.0" encoding="utf-8"?>
 <p:sld xmlns:a="http://schemas.openxmlformats.org/drawingml/2006/main" xmlns:r="http://schemas.openxmlformats.org/officeDocument/2006/relationships" xmlns:p="http://schemas.openxmlformats.org/presentationml/2006/main">
   <p:cSld>
@@ -4149,13 +4508,33 @@
           <a:bodyPr/>
           <a:lstStyle/>
           <a:p>
-            <a:pPr marL="0" indent="0">
-              <a:buNone/>
-            </a:pPr>
-            <a:r>
-              <a:rPr lang="en-US" dirty="0"/>
-              <a:t>List rules here</a:t>
-            </a:r>
+            <a:r>
+              <a:rPr lang="en-US" dirty="0"/>
+              <a:t>don’t necessarily need them</a:t>
+            </a:r>
+          </a:p>
+          <a:p>
+            <a:r>
+              <a:rPr lang="en-US" dirty="0"/>
+              <a:t>Automatically sets the values to 0/null</a:t>
+            </a:r>
+          </a:p>
+          <a:p>
+            <a:r>
+              <a:rPr lang="en-US" dirty="0"/>
+              <a:t>Cannot contain explicit </a:t>
+            </a:r>
+            <a:r>
+              <a:rPr lang="en-US" dirty="0" err="1"/>
+              <a:t>parameterless</a:t>
+            </a:r>
+            <a:r>
+              <a:rPr lang="en-US" dirty="0"/>
+              <a:t> constructors</a:t>
+            </a:r>
+          </a:p>
+          <a:p>
+            <a:endParaRPr lang="en-US" dirty="0"/>
           </a:p>
         </p:txBody>
       </p:sp>
@@ -4325,6 +4704,282 @@
     <p:extLst>
       <p:ext uri="{BB962C8B-B14F-4D97-AF65-F5344CB8AC3E}">
         <p14:creationId xmlns:p14="http://schemas.microsoft.com/office/powerpoint/2010/main" val="591969481"/>
+      </p:ext>
+    </p:extLst>
+  </p:cSld>
+  <p:clrMapOvr>
+    <a:masterClrMapping/>
+  </p:clrMapOvr>
+</p:sld>
+</file>
+
+<file path=ppt/slides/slide9.xml><?xml version="1.0" encoding="utf-8"?>
+<p:sld xmlns:a="http://schemas.openxmlformats.org/drawingml/2006/main" xmlns:r="http://schemas.openxmlformats.org/officeDocument/2006/relationships" xmlns:p="http://schemas.openxmlformats.org/presentationml/2006/main">
+  <p:cSld>
+    <p:spTree>
+      <p:nvGrpSpPr>
+        <p:cNvPr id="1" name=""/>
+        <p:cNvGrpSpPr/>
+        <p:nvPr/>
+      </p:nvGrpSpPr>
+      <p:grpSpPr>
+        <a:xfrm>
+          <a:off x="0" y="0"/>
+          <a:ext cx="0" cy="0"/>
+          <a:chOff x="0" y="0"/>
+          <a:chExt cx="0" cy="0"/>
+        </a:xfrm>
+      </p:grpSpPr>
+      <p:sp>
+        <p:nvSpPr>
+          <p:cNvPr id="2" name="Title 1">
+            <a:extLst>
+              <a:ext uri="{FF2B5EF4-FFF2-40B4-BE49-F238E27FC236}">
+                <a16:creationId xmlns:a16="http://schemas.microsoft.com/office/drawing/2014/main" id="{21C1F1D8-6082-39E4-37EE-BA61A61A7AC4}"/>
+              </a:ext>
+            </a:extLst>
+          </p:cNvPr>
+          <p:cNvSpPr>
+            <a:spLocks noGrp="1"/>
+          </p:cNvSpPr>
+          <p:nvPr>
+            <p:ph type="title"/>
+          </p:nvPr>
+        </p:nvSpPr>
+        <p:spPr/>
+        <p:txBody>
+          <a:bodyPr/>
+          <a:lstStyle/>
+          <a:p>
+            <a:r>
+              <a:rPr lang="en-US" dirty="0"/>
+              <a:t>Operator Overloads</a:t>
+            </a:r>
+          </a:p>
+        </p:txBody>
+      </p:sp>
+      <p:sp>
+        <p:nvSpPr>
+          <p:cNvPr id="3" name="Content Placeholder 2">
+            <a:extLst>
+              <a:ext uri="{FF2B5EF4-FFF2-40B4-BE49-F238E27FC236}">
+                <a16:creationId xmlns:a16="http://schemas.microsoft.com/office/drawing/2014/main" id="{683E772F-F90D-6B66-B1AC-1E67C7CC9A56}"/>
+              </a:ext>
+            </a:extLst>
+          </p:cNvPr>
+          <p:cNvSpPr>
+            <a:spLocks noGrp="1"/>
+          </p:cNvSpPr>
+          <p:nvPr>
+            <p:ph idx="1"/>
+          </p:nvPr>
+        </p:nvSpPr>
+        <p:spPr/>
+        <p:txBody>
+          <a:bodyPr/>
+          <a:lstStyle/>
+          <a:p>
+            <a:r>
+              <a:rPr lang="en-US" dirty="0"/>
+              <a:t>Fundamentally, you can “overwrite how even basic functions work”</a:t>
+            </a:r>
+          </a:p>
+          <a:p>
+            <a:pPr lvl="1"/>
+            <a:r>
+              <a:rPr lang="en-US" dirty="0"/>
+              <a:t>Need to check if you can do it with primitive</a:t>
+            </a:r>
+          </a:p>
+          <a:p>
+            <a:pPr marL="0" indent="0">
+              <a:buNone/>
+            </a:pPr>
+            <a:endParaRPr lang="en-US" dirty="0"/>
+          </a:p>
+        </p:txBody>
+      </p:sp>
+      <p:sp>
+        <p:nvSpPr>
+          <p:cNvPr id="4" name="Rectangle 3">
+            <a:extLst>
+              <a:ext uri="{FF2B5EF4-FFF2-40B4-BE49-F238E27FC236}">
+                <a16:creationId xmlns:a16="http://schemas.microsoft.com/office/drawing/2014/main" id="{A5A1501D-14CC-C185-4073-856754F4CC92}"/>
+              </a:ext>
+            </a:extLst>
+          </p:cNvPr>
+          <p:cNvSpPr/>
+          <p:nvPr/>
+        </p:nvSpPr>
+        <p:spPr>
+          <a:xfrm>
+            <a:off x="960120" y="3429000"/>
+            <a:ext cx="1758462" cy="1017563"/>
+          </a:xfrm>
+          <a:prstGeom prst="rect">
+            <a:avLst/>
+          </a:prstGeom>
+        </p:spPr>
+        <p:style>
+          <a:lnRef idx="2">
+            <a:schemeClr val="accent1">
+              <a:shade val="50000"/>
+            </a:schemeClr>
+          </a:lnRef>
+          <a:fillRef idx="1">
+            <a:schemeClr val="accent1"/>
+          </a:fillRef>
+          <a:effectRef idx="0">
+            <a:schemeClr val="accent1"/>
+          </a:effectRef>
+          <a:fontRef idx="minor">
+            <a:schemeClr val="lt1"/>
+          </a:fontRef>
+        </p:style>
+        <p:txBody>
+          <a:bodyPr rtlCol="0" anchor="ctr"/>
+          <a:lstStyle/>
+          <a:p>
+            <a:pPr algn="ctr"/>
+            <a:r>
+              <a:rPr lang="en-US" dirty="0"/>
+              <a:t>Operator in C#</a:t>
+            </a:r>
+          </a:p>
+        </p:txBody>
+      </p:sp>
+      <p:pic>
+        <p:nvPicPr>
+          <p:cNvPr id="6" name="Picture 5">
+            <a:extLst>
+              <a:ext uri="{FF2B5EF4-FFF2-40B4-BE49-F238E27FC236}">
+                <a16:creationId xmlns:a16="http://schemas.microsoft.com/office/drawing/2014/main" id="{D41460BC-CC51-E935-9587-42BE00D2E334}"/>
+              </a:ext>
+            </a:extLst>
+          </p:cNvPr>
+          <p:cNvPicPr>
+            <a:picLocks noChangeAspect="1"/>
+          </p:cNvPicPr>
+          <p:nvPr/>
+        </p:nvPicPr>
+        <p:blipFill>
+          <a:blip r:embed="rId2"/>
+          <a:stretch>
+            <a:fillRect/>
+          </a:stretch>
+        </p:blipFill>
+        <p:spPr>
+          <a:xfrm>
+            <a:off x="2782053" y="4629901"/>
+            <a:ext cx="4819192" cy="1764227"/>
+          </a:xfrm>
+          <a:prstGeom prst="rect">
+            <a:avLst/>
+          </a:prstGeom>
+        </p:spPr>
+      </p:pic>
+      <p:sp>
+        <p:nvSpPr>
+          <p:cNvPr id="10" name="Rectangle 9">
+            <a:extLst>
+              <a:ext uri="{FF2B5EF4-FFF2-40B4-BE49-F238E27FC236}">
+                <a16:creationId xmlns:a16="http://schemas.microsoft.com/office/drawing/2014/main" id="{F7F1E33A-C04C-C71A-2FDF-17DFC9490F46}"/>
+              </a:ext>
+            </a:extLst>
+          </p:cNvPr>
+          <p:cNvSpPr/>
+          <p:nvPr/>
+        </p:nvSpPr>
+        <p:spPr>
+          <a:xfrm>
+            <a:off x="4502834" y="3395173"/>
+            <a:ext cx="1758462" cy="1017563"/>
+          </a:xfrm>
+          <a:prstGeom prst="rect">
+            <a:avLst/>
+          </a:prstGeom>
+        </p:spPr>
+        <p:style>
+          <a:lnRef idx="2">
+            <a:schemeClr val="accent1">
+              <a:shade val="50000"/>
+            </a:schemeClr>
+          </a:lnRef>
+          <a:fillRef idx="1">
+            <a:schemeClr val="accent1"/>
+          </a:fillRef>
+          <a:effectRef idx="0">
+            <a:schemeClr val="accent1"/>
+          </a:effectRef>
+          <a:fontRef idx="minor">
+            <a:schemeClr val="lt1"/>
+          </a:fontRef>
+        </p:style>
+        <p:txBody>
+          <a:bodyPr rtlCol="0" anchor="ctr"/>
+          <a:lstStyle/>
+          <a:p>
+            <a:pPr algn="ctr"/>
+            <a:r>
+              <a:rPr lang="en-US" dirty="0"/>
+              <a:t>Overload CLR operator</a:t>
+            </a:r>
+          </a:p>
+        </p:txBody>
+      </p:sp>
+      <p:sp>
+        <p:nvSpPr>
+          <p:cNvPr id="12" name="Rectangle 11">
+            <a:extLst>
+              <a:ext uri="{FF2B5EF4-FFF2-40B4-BE49-F238E27FC236}">
+                <a16:creationId xmlns:a16="http://schemas.microsoft.com/office/drawing/2014/main" id="{65A1ACE4-9E82-B554-0322-FA0CBB9B9941}"/>
+              </a:ext>
+            </a:extLst>
+          </p:cNvPr>
+          <p:cNvSpPr/>
+          <p:nvPr/>
+        </p:nvSpPr>
+        <p:spPr>
+          <a:xfrm>
+            <a:off x="7450015" y="3429000"/>
+            <a:ext cx="1758462" cy="1017563"/>
+          </a:xfrm>
+          <a:prstGeom prst="rect">
+            <a:avLst/>
+          </a:prstGeom>
+        </p:spPr>
+        <p:style>
+          <a:lnRef idx="2">
+            <a:schemeClr val="accent1">
+              <a:shade val="50000"/>
+            </a:schemeClr>
+          </a:lnRef>
+          <a:fillRef idx="1">
+            <a:schemeClr val="accent1"/>
+          </a:fillRef>
+          <a:effectRef idx="0">
+            <a:schemeClr val="accent1"/>
+          </a:effectRef>
+          <a:fontRef idx="minor">
+            <a:schemeClr val="lt1"/>
+          </a:fontRef>
+        </p:style>
+        <p:txBody>
+          <a:bodyPr rtlCol="0" anchor="ctr"/>
+          <a:lstStyle/>
+          <a:p>
+            <a:pPr algn="ctr"/>
+            <a:r>
+              <a:rPr lang="en-US" dirty="0"/>
+              <a:t>Use overloaded operator</a:t>
+            </a:r>
+          </a:p>
+        </p:txBody>
+      </p:sp>
+    </p:spTree>
+    <p:extLst>
+      <p:ext uri="{BB962C8B-B14F-4D97-AF65-F5344CB8AC3E}">
+        <p14:creationId xmlns:p14="http://schemas.microsoft.com/office/powerpoint/2010/main" val="1658679551"/>
       </p:ext>
     </p:extLst>
   </p:cSld>

</xml_diff>

<commit_message>
commiting the final changes for ch8
</commit_message>
<xml_diff>
--- a/CLR_via_CSharp/Chapter8/Methods.pptx
+++ b/CLR_via_CSharp/Chapter8/Methods.pptx
@@ -3892,12 +3892,63 @@
             </a:r>
           </a:p>
           <a:p>
+            <a:pPr lvl="1"/>
             <a:r>
               <a:rPr lang="en-US" dirty="0">
                 <a:sym typeface="Wingdings" panose="05000000000000000000" pitchFamily="2" charset="2"/>
               </a:rPr>
+              <a:t>Generally allocated on stack</a:t>
+            </a:r>
+          </a:p>
+          <a:p>
+            <a:pPr lvl="1"/>
+            <a:r>
+              <a:rPr lang="en-US" dirty="0">
+                <a:sym typeface="Wingdings" panose="05000000000000000000" pitchFamily="2" charset="2"/>
+              </a:rPr>
+              <a:t>‘keyword of struct’</a:t>
+            </a:r>
+          </a:p>
+          <a:p>
+            <a:r>
+              <a:rPr lang="en-US" dirty="0">
+                <a:sym typeface="Wingdings" panose="05000000000000000000" pitchFamily="2" charset="2"/>
+              </a:rPr>
               <a:t>Reference types  point/refer to their values</a:t>
             </a:r>
+          </a:p>
+          <a:p>
+            <a:pPr lvl="1"/>
+            <a:r>
+              <a:rPr lang="en-US" dirty="0">
+                <a:sym typeface="Wingdings" panose="05000000000000000000" pitchFamily="2" charset="2"/>
+              </a:rPr>
+              <a:t>On heap</a:t>
+            </a:r>
+          </a:p>
+          <a:p>
+            <a:pPr lvl="1"/>
+            <a:r>
+              <a:rPr lang="en-US" dirty="0">
+                <a:sym typeface="Wingdings" panose="05000000000000000000" pitchFamily="2" charset="2"/>
+              </a:rPr>
+              <a:t>‘class’</a:t>
+            </a:r>
+          </a:p>
+          <a:p>
+            <a:pPr lvl="1"/>
+            <a:r>
+              <a:rPr lang="en-US" dirty="0">
+                <a:sym typeface="Wingdings" panose="05000000000000000000" pitchFamily="2" charset="2"/>
+              </a:rPr>
+              <a:t>Can contain references. Each instance is different</a:t>
+            </a:r>
+          </a:p>
+          <a:p>
+            <a:pPr lvl="1"/>
+            <a:endParaRPr lang="en-US" dirty="0">
+              <a:sym typeface="Wingdings" panose="05000000000000000000" pitchFamily="2" charset="2"/>
+            </a:endParaRPr>
           </a:p>
           <a:p>
             <a:endParaRPr lang="en-US" dirty="0"/>
@@ -4937,17 +4988,8 @@
               <a:rPr lang="en-US" dirty="0">
                 <a:sym typeface="Wingdings" panose="05000000000000000000" pitchFamily="2" charset="2"/>
               </a:rPr>
-              <a:t>In generalization  I view these as “instantiating the type” in </a:t>
-            </a:r>
-            <a:r>
-              <a:rPr lang="en-US">
-                <a:sym typeface="Wingdings" panose="05000000000000000000" pitchFamily="2" charset="2"/>
-              </a:rPr>
-              <a:t>the CLR</a:t>
-            </a:r>
-            <a:endParaRPr lang="en-US" dirty="0">
-              <a:sym typeface="Wingdings" panose="05000000000000000000" pitchFamily="2" charset="2"/>
-            </a:endParaRPr>
+              <a:t>In generalization  I view these as “instantiating the type” in the CLR</a:t>
+            </a:r>
           </a:p>
           <a:p>
             <a:pPr marL="0" indent="0">
@@ -5070,7 +5112,7 @@
         </p:nvSpPr>
         <p:spPr>
           <a:xfrm>
-            <a:off x="960120" y="3429000"/>
+            <a:off x="960120" y="3357404"/>
             <a:ext cx="1758462" cy="1017563"/>
           </a:xfrm>
           <a:prstGeom prst="rect">
@@ -5149,7 +5191,7 @@
         </p:nvSpPr>
         <p:spPr>
           <a:xfrm>
-            <a:off x="4502834" y="3395173"/>
+            <a:off x="4205067" y="3357404"/>
             <a:ext cx="1758462" cy="1017563"/>
           </a:xfrm>
           <a:prstGeom prst="rect">
@@ -5198,7 +5240,7 @@
         </p:nvSpPr>
         <p:spPr>
           <a:xfrm>
-            <a:off x="7450015" y="3429000"/>
+            <a:off x="7571934" y="3357404"/>
             <a:ext cx="1758462" cy="1017563"/>
           </a:xfrm>
           <a:prstGeom prst="rect">

</xml_diff>